<commit_message>
[AC05] - parte 1
</commit_message>
<xml_diff>
--- a/Documentation/15. Arquitetura_de_Negócio_para_cada_Cenário.pptx
+++ b/Documentation/15. Arquitetura_de_Negócio_para_cada_Cenário.pptx
@@ -118,16 +118,39 @@
 </p:presentation>
 </file>
 
-<file path=ppt/revisionInfo.xml><?xml version="1.0" encoding="utf-8"?>
-<p1510:revInfo xmlns:a="http://schemas.openxmlformats.org/drawingml/2006/main" xmlns:r="http://schemas.openxmlformats.org/officeDocument/2006/relationships" xmlns:p1510="http://schemas.microsoft.com/office/powerpoint/2015/10/main">
-  <p1510:revLst>
-    <p1510:client id="{E7C69A7C-A215-426B-8AAA-22D3B1BFACE3}" v="27" dt="2021-04-19T14:32:25.668"/>
-  </p1510:revLst>
-</p1510:revInfo>
-</file>
-
 <file path=ppt/changesInfos/changesInfo1.xml><?xml version="1.0" encoding="utf-8"?>
 <pc:chgInfo xmlns:a="http://schemas.openxmlformats.org/drawingml/2006/main" xmlns:r="http://schemas.openxmlformats.org/officeDocument/2006/relationships" xmlns:ac="http://schemas.microsoft.com/office/drawing/2013/main/command" xmlns:pc="http://schemas.microsoft.com/office/powerpoint/2013/main/command">
+  <pc:docChgLst>
+    <pc:chgData name="Gyovane Souzza" userId="eed59d4ebf12600b" providerId="LiveId" clId="{C992C44B-EE01-4AFC-A8DA-1765C7091D9B}"/>
+    <pc:docChg chg="modSld sldOrd">
+      <pc:chgData name="Gyovane Souzza" userId="eed59d4ebf12600b" providerId="LiveId" clId="{C992C44B-EE01-4AFC-A8DA-1765C7091D9B}" dt="2021-05-18T16:13:06.107" v="12" actId="20577"/>
+      <pc:docMkLst>
+        <pc:docMk/>
+      </pc:docMkLst>
+      <pc:sldChg chg="ord">
+        <pc:chgData name="Gyovane Souzza" userId="eed59d4ebf12600b" providerId="LiveId" clId="{C992C44B-EE01-4AFC-A8DA-1765C7091D9B}" dt="2021-05-18T02:21:20.597" v="1"/>
+        <pc:sldMkLst>
+          <pc:docMk/>
+          <pc:sldMk cId="1854106566" sldId="266"/>
+        </pc:sldMkLst>
+      </pc:sldChg>
+      <pc:sldChg chg="modSp mod">
+        <pc:chgData name="Gyovane Souzza" userId="eed59d4ebf12600b" providerId="LiveId" clId="{C992C44B-EE01-4AFC-A8DA-1765C7091D9B}" dt="2021-05-18T16:13:06.107" v="12" actId="20577"/>
+        <pc:sldMkLst>
+          <pc:docMk/>
+          <pc:sldMk cId="910407705" sldId="270"/>
+        </pc:sldMkLst>
+        <pc:spChg chg="mod">
+          <ac:chgData name="Gyovane Souzza" userId="eed59d4ebf12600b" providerId="LiveId" clId="{C992C44B-EE01-4AFC-A8DA-1765C7091D9B}" dt="2021-05-18T16:13:06.107" v="12" actId="20577"/>
+          <ac:spMkLst>
+            <pc:docMk/>
+            <pc:sldMk cId="910407705" sldId="270"/>
+            <ac:spMk id="17" creationId="{59C2518D-BE03-4C45-BB4B-D6EF1E892629}"/>
+          </ac:spMkLst>
+        </pc:spChg>
+      </pc:sldChg>
+    </pc:docChg>
+  </pc:docChgLst>
   <pc:docChgLst>
     <pc:chgData name="Deivison Andrade Souza" userId="bc490d82787b51a2" providerId="LiveId" clId="{18C074D4-1E9F-42B9-A51D-65B4F691BFB6}"/>
     <pc:docChg chg="undo custSel modSld">
@@ -984,7 +1007,7 @@
           <a:p>
             <a:fld id="{2E0DF6E3-1D5C-4094-B81B-572E3744A14B}" type="datetimeFigureOut">
               <a:rPr lang="pt-BR" smtClean="0"/>
-              <a:t>03/05/2021</a:t>
+              <a:t>18/05/2021</a:t>
             </a:fld>
             <a:endParaRPr lang="pt-BR"/>
           </a:p>
@@ -1152,7 +1175,7 @@
           <a:p>
             <a:fld id="{2E0DF6E3-1D5C-4094-B81B-572E3744A14B}" type="datetimeFigureOut">
               <a:rPr lang="pt-BR" smtClean="0"/>
-              <a:t>03/05/2021</a:t>
+              <a:t>18/05/2021</a:t>
             </a:fld>
             <a:endParaRPr lang="pt-BR"/>
           </a:p>
@@ -1330,7 +1353,7 @@
           <a:p>
             <a:fld id="{2E0DF6E3-1D5C-4094-B81B-572E3744A14B}" type="datetimeFigureOut">
               <a:rPr lang="pt-BR" smtClean="0"/>
-              <a:t>03/05/2021</a:t>
+              <a:t>18/05/2021</a:t>
             </a:fld>
             <a:endParaRPr lang="pt-BR"/>
           </a:p>
@@ -1498,7 +1521,7 @@
           <a:p>
             <a:fld id="{2E0DF6E3-1D5C-4094-B81B-572E3744A14B}" type="datetimeFigureOut">
               <a:rPr lang="pt-BR" smtClean="0"/>
-              <a:t>03/05/2021</a:t>
+              <a:t>18/05/2021</a:t>
             </a:fld>
             <a:endParaRPr lang="pt-BR"/>
           </a:p>
@@ -1743,7 +1766,7 @@
           <a:p>
             <a:fld id="{2E0DF6E3-1D5C-4094-B81B-572E3744A14B}" type="datetimeFigureOut">
               <a:rPr lang="pt-BR" smtClean="0"/>
-              <a:t>03/05/2021</a:t>
+              <a:t>18/05/2021</a:t>
             </a:fld>
             <a:endParaRPr lang="pt-BR"/>
           </a:p>
@@ -1972,7 +1995,7 @@
           <a:p>
             <a:fld id="{2E0DF6E3-1D5C-4094-B81B-572E3744A14B}" type="datetimeFigureOut">
               <a:rPr lang="pt-BR" smtClean="0"/>
-              <a:t>03/05/2021</a:t>
+              <a:t>18/05/2021</a:t>
             </a:fld>
             <a:endParaRPr lang="pt-BR"/>
           </a:p>
@@ -2336,7 +2359,7 @@
           <a:p>
             <a:fld id="{2E0DF6E3-1D5C-4094-B81B-572E3744A14B}" type="datetimeFigureOut">
               <a:rPr lang="pt-BR" smtClean="0"/>
-              <a:t>03/05/2021</a:t>
+              <a:t>18/05/2021</a:t>
             </a:fld>
             <a:endParaRPr lang="pt-BR"/>
           </a:p>
@@ -2453,7 +2476,7 @@
           <a:p>
             <a:fld id="{2E0DF6E3-1D5C-4094-B81B-572E3744A14B}" type="datetimeFigureOut">
               <a:rPr lang="pt-BR" smtClean="0"/>
-              <a:t>03/05/2021</a:t>
+              <a:t>18/05/2021</a:t>
             </a:fld>
             <a:endParaRPr lang="pt-BR"/>
           </a:p>
@@ -2548,7 +2571,7 @@
           <a:p>
             <a:fld id="{2E0DF6E3-1D5C-4094-B81B-572E3744A14B}" type="datetimeFigureOut">
               <a:rPr lang="pt-BR" smtClean="0"/>
-              <a:t>03/05/2021</a:t>
+              <a:t>18/05/2021</a:t>
             </a:fld>
             <a:endParaRPr lang="pt-BR"/>
           </a:p>
@@ -2823,7 +2846,7 @@
           <a:p>
             <a:fld id="{2E0DF6E3-1D5C-4094-B81B-572E3744A14B}" type="datetimeFigureOut">
               <a:rPr lang="pt-BR" smtClean="0"/>
-              <a:t>03/05/2021</a:t>
+              <a:t>18/05/2021</a:t>
             </a:fld>
             <a:endParaRPr lang="pt-BR"/>
           </a:p>
@@ -3075,7 +3098,7 @@
           <a:p>
             <a:fld id="{2E0DF6E3-1D5C-4094-B81B-572E3744A14B}" type="datetimeFigureOut">
               <a:rPr lang="pt-BR" smtClean="0"/>
-              <a:t>03/05/2021</a:t>
+              <a:t>18/05/2021</a:t>
             </a:fld>
             <a:endParaRPr lang="pt-BR"/>
           </a:p>
@@ -3286,7 +3309,7 @@
           <a:p>
             <a:fld id="{2E0DF6E3-1D5C-4094-B81B-572E3744A14B}" type="datetimeFigureOut">
               <a:rPr lang="pt-BR" smtClean="0"/>
-              <a:t>03/05/2021</a:t>
+              <a:t>18/05/2021</a:t>
             </a:fld>
             <a:endParaRPr lang="pt-BR"/>
           </a:p>
@@ -7288,7 +7311,7 @@
                 <a:latin typeface="Arial" panose="020B0604020202020204" pitchFamily="34" charset="0"/>
                 <a:cs typeface="Arial" panose="020B0604020202020204" pitchFamily="34" charset="0"/>
               </a:rPr>
-              <a:t>Tratar empacotamento   </a:t>
+              <a:t>Tratar empacotamento sob medida   </a:t>
             </a:r>
           </a:p>
         </p:txBody>
@@ -9335,18 +9358,11 @@
           <a:p>
             <a:pPr algn="ctr"/>
             <a:r>
-              <a:rPr lang="pt-BR" sz="1200" dirty="0" smtClean="0">
-                <a:latin typeface="Arial" panose="020B0604020202020204" pitchFamily="34" charset="0"/>
-                <a:cs typeface="Arial" panose="020B0604020202020204" pitchFamily="34" charset="0"/>
-              </a:rPr>
-              <a:t>Tratar abastecimento de </a:t>
-            </a:r>
-            <a:r>
               <a:rPr lang="pt-BR" sz="1200" dirty="0">
                 <a:latin typeface="Arial" panose="020B0604020202020204" pitchFamily="34" charset="0"/>
                 <a:cs typeface="Arial" panose="020B0604020202020204" pitchFamily="34" charset="0"/>
               </a:rPr>
-              <a:t>estoque</a:t>
+              <a:t>Tratar abastecimento de estoque</a:t>
             </a:r>
           </a:p>
         </p:txBody>

</xml_diff>